<commit_message>
customizable threshold and front-end fixes not working threshold yet. value is passed to process_sample but not used. keeping 0.25 as default. frontend still has issues with stuff like edge cases.
</commit_message>
<xml_diff>
--- a/raman_week6.pptx
+++ b/raman_week6.pptx
@@ -5,13 +5,9 @@
     <p:sldMasterId id="2147483648" r:id="rId1"/>
   </p:sldMasterIdLst>
   <p:sldIdLst>
-    <p:sldId id="261" r:id="rId2"/>
-    <p:sldId id="262" r:id="rId3"/>
-    <p:sldId id="263" r:id="rId4"/>
-    <p:sldId id="264" r:id="rId5"/>
-    <p:sldId id="259" r:id="rId6"/>
-    <p:sldId id="260" r:id="rId7"/>
-    <p:sldId id="258" r:id="rId8"/>
+    <p:sldId id="259" r:id="rId2"/>
+    <p:sldId id="260" r:id="rId3"/>
+    <p:sldId id="258" r:id="rId4"/>
   </p:sldIdLst>
   <p:sldSz cx="12192000" cy="6858000"/>
   <p:notesSz cx="6858000" cy="9144000"/>
@@ -267,7 +263,7 @@
           <a:p>
             <a:fld id="{6822D85E-D2FB-42BA-8FC7-836FE23099A3}" type="datetimeFigureOut">
               <a:rPr lang="en-CH" smtClean="0"/>
-              <a:t>20.10.2025</a:t>
+              <a:t>24.10.2025</a:t>
             </a:fld>
             <a:endParaRPr lang="en-CH"/>
           </a:p>
@@ -467,7 +463,7 @@
           <a:p>
             <a:fld id="{6822D85E-D2FB-42BA-8FC7-836FE23099A3}" type="datetimeFigureOut">
               <a:rPr lang="en-CH" smtClean="0"/>
-              <a:t>20.10.2025</a:t>
+              <a:t>24.10.2025</a:t>
             </a:fld>
             <a:endParaRPr lang="en-CH"/>
           </a:p>
@@ -677,7 +673,7 @@
           <a:p>
             <a:fld id="{6822D85E-D2FB-42BA-8FC7-836FE23099A3}" type="datetimeFigureOut">
               <a:rPr lang="en-CH" smtClean="0"/>
-              <a:t>20.10.2025</a:t>
+              <a:t>24.10.2025</a:t>
             </a:fld>
             <a:endParaRPr lang="en-CH"/>
           </a:p>
@@ -877,7 +873,7 @@
           <a:p>
             <a:fld id="{6822D85E-D2FB-42BA-8FC7-836FE23099A3}" type="datetimeFigureOut">
               <a:rPr lang="en-CH" smtClean="0"/>
-              <a:t>20.10.2025</a:t>
+              <a:t>24.10.2025</a:t>
             </a:fld>
             <a:endParaRPr lang="en-CH"/>
           </a:p>
@@ -1153,7 +1149,7 @@
           <a:p>
             <a:fld id="{6822D85E-D2FB-42BA-8FC7-836FE23099A3}" type="datetimeFigureOut">
               <a:rPr lang="en-CH" smtClean="0"/>
-              <a:t>20.10.2025</a:t>
+              <a:t>24.10.2025</a:t>
             </a:fld>
             <a:endParaRPr lang="en-CH"/>
           </a:p>
@@ -1421,7 +1417,7 @@
           <a:p>
             <a:fld id="{6822D85E-D2FB-42BA-8FC7-836FE23099A3}" type="datetimeFigureOut">
               <a:rPr lang="en-CH" smtClean="0"/>
-              <a:t>20.10.2025</a:t>
+              <a:t>24.10.2025</a:t>
             </a:fld>
             <a:endParaRPr lang="en-CH"/>
           </a:p>
@@ -1836,7 +1832,7 @@
           <a:p>
             <a:fld id="{6822D85E-D2FB-42BA-8FC7-836FE23099A3}" type="datetimeFigureOut">
               <a:rPr lang="en-CH" smtClean="0"/>
-              <a:t>20.10.2025</a:t>
+              <a:t>24.10.2025</a:t>
             </a:fld>
             <a:endParaRPr lang="en-CH"/>
           </a:p>
@@ -1978,7 +1974,7 @@
           <a:p>
             <a:fld id="{6822D85E-D2FB-42BA-8FC7-836FE23099A3}" type="datetimeFigureOut">
               <a:rPr lang="en-CH" smtClean="0"/>
-              <a:t>20.10.2025</a:t>
+              <a:t>24.10.2025</a:t>
             </a:fld>
             <a:endParaRPr lang="en-CH"/>
           </a:p>
@@ -2091,7 +2087,7 @@
           <a:p>
             <a:fld id="{6822D85E-D2FB-42BA-8FC7-836FE23099A3}" type="datetimeFigureOut">
               <a:rPr lang="en-CH" smtClean="0"/>
-              <a:t>20.10.2025</a:t>
+              <a:t>24.10.2025</a:t>
             </a:fld>
             <a:endParaRPr lang="en-CH"/>
           </a:p>
@@ -2404,7 +2400,7 @@
           <a:p>
             <a:fld id="{6822D85E-D2FB-42BA-8FC7-836FE23099A3}" type="datetimeFigureOut">
               <a:rPr lang="en-CH" smtClean="0"/>
-              <a:t>20.10.2025</a:t>
+              <a:t>24.10.2025</a:t>
             </a:fld>
             <a:endParaRPr lang="en-CH"/>
           </a:p>
@@ -2693,7 +2689,7 @@
           <a:p>
             <a:fld id="{6822D85E-D2FB-42BA-8FC7-836FE23099A3}" type="datetimeFigureOut">
               <a:rPr lang="en-CH" smtClean="0"/>
-              <a:t>20.10.2025</a:t>
+              <a:t>24.10.2025</a:t>
             </a:fld>
             <a:endParaRPr lang="en-CH"/>
           </a:p>
@@ -2936,7 +2932,7 @@
           <a:p>
             <a:fld id="{6822D85E-D2FB-42BA-8FC7-836FE23099A3}" type="datetimeFigureOut">
               <a:rPr lang="en-CH" smtClean="0"/>
-              <a:t>20.10.2025</a:t>
+              <a:t>24.10.2025</a:t>
             </a:fld>
             <a:endParaRPr lang="en-CH"/>
           </a:p>
@@ -3358,1413 +3354,6 @@
           <p:cNvPr id="2" name="Title 1">
             <a:extLst>
               <a:ext uri="{FF2B5EF4-FFF2-40B4-BE49-F238E27FC236}">
-                <a16:creationId xmlns:a16="http://schemas.microsoft.com/office/drawing/2014/main" id="{9F553C9B-4A62-4AFA-BE9B-3E33A245A8CB}"/>
-              </a:ext>
-            </a:extLst>
-          </p:cNvPr>
-          <p:cNvSpPr>
-            <a:spLocks noGrp="1"/>
-          </p:cNvSpPr>
-          <p:nvPr>
-            <p:ph type="ctrTitle"/>
-          </p:nvPr>
-        </p:nvSpPr>
-        <p:spPr>
-          <a:xfrm>
-            <a:off x="-945821" y="113413"/>
-            <a:ext cx="5046482" cy="504047"/>
-          </a:xfrm>
-        </p:spPr>
-        <p:txBody>
-          <a:bodyPr>
-            <a:normAutofit/>
-          </a:bodyPr>
-          <a:lstStyle/>
-          <a:p>
-            <a:r>
-              <a:rPr lang="en-US" sz="2400" dirty="0"/>
-              <a:t>Architecture pipeline</a:t>
-            </a:r>
-            <a:endParaRPr lang="en-CH" sz="2400" dirty="0"/>
-          </a:p>
-        </p:txBody>
-      </p:sp>
-      <p:pic>
-        <p:nvPicPr>
-          <p:cNvPr id="5" name="Picture 4">
-            <a:extLst>
-              <a:ext uri="{FF2B5EF4-FFF2-40B4-BE49-F238E27FC236}">
-                <a16:creationId xmlns:a16="http://schemas.microsoft.com/office/drawing/2014/main" id="{BF394FAE-A03D-BA42-90D5-6B305A0B7E61}"/>
-              </a:ext>
-            </a:extLst>
-          </p:cNvPr>
-          <p:cNvPicPr>
-            <a:picLocks noChangeAspect="1"/>
-          </p:cNvPicPr>
-          <p:nvPr/>
-        </p:nvPicPr>
-        <p:blipFill>
-          <a:blip r:embed="rId2"/>
-          <a:stretch>
-            <a:fillRect/>
-          </a:stretch>
-        </p:blipFill>
-        <p:spPr>
-          <a:xfrm>
-            <a:off x="175968" y="1036951"/>
-            <a:ext cx="6077798" cy="1352739"/>
-          </a:xfrm>
-          <a:prstGeom prst="rect">
-            <a:avLst/>
-          </a:prstGeom>
-        </p:spPr>
-      </p:pic>
-      <p:sp>
-        <p:nvSpPr>
-          <p:cNvPr id="13" name="Freeform: Shape 12">
-            <a:extLst>
-              <a:ext uri="{FF2B5EF4-FFF2-40B4-BE49-F238E27FC236}">
-                <a16:creationId xmlns:a16="http://schemas.microsoft.com/office/drawing/2014/main" id="{08BAD736-F0B6-AA93-3B98-E69A4A9B351B}"/>
-              </a:ext>
-            </a:extLst>
-          </p:cNvPr>
-          <p:cNvSpPr/>
-          <p:nvPr/>
-        </p:nvSpPr>
-        <p:spPr>
-          <a:xfrm>
-            <a:off x="3110845" y="1055802"/>
-            <a:ext cx="3035431" cy="895546"/>
-          </a:xfrm>
-          <a:custGeom>
-            <a:avLst/>
-            <a:gdLst>
-              <a:gd name="connsiteX0" fmla="*/ 1414021 w 3035431"/>
-              <a:gd name="connsiteY0" fmla="*/ 414779 h 895546"/>
-              <a:gd name="connsiteX1" fmla="*/ 1461155 w 3035431"/>
-              <a:gd name="connsiteY1" fmla="*/ 0 h 895546"/>
-              <a:gd name="connsiteX2" fmla="*/ 3026004 w 3035431"/>
-              <a:gd name="connsiteY2" fmla="*/ 37707 h 895546"/>
-              <a:gd name="connsiteX3" fmla="*/ 3035431 w 3035431"/>
-              <a:gd name="connsiteY3" fmla="*/ 895546 h 895546"/>
-              <a:gd name="connsiteX4" fmla="*/ 0 w 3035431"/>
-              <a:gd name="connsiteY4" fmla="*/ 886120 h 895546"/>
-              <a:gd name="connsiteX5" fmla="*/ 28281 w 3035431"/>
-              <a:gd name="connsiteY5" fmla="*/ 414779 h 895546"/>
-              <a:gd name="connsiteX6" fmla="*/ 1414021 w 3035431"/>
-              <a:gd name="connsiteY6" fmla="*/ 414779 h 895546"/>
-            </a:gdLst>
-            <a:ahLst/>
-            <a:cxnLst>
-              <a:cxn ang="0">
-                <a:pos x="connsiteX0" y="connsiteY0"/>
-              </a:cxn>
-              <a:cxn ang="0">
-                <a:pos x="connsiteX1" y="connsiteY1"/>
-              </a:cxn>
-              <a:cxn ang="0">
-                <a:pos x="connsiteX2" y="connsiteY2"/>
-              </a:cxn>
-              <a:cxn ang="0">
-                <a:pos x="connsiteX3" y="connsiteY3"/>
-              </a:cxn>
-              <a:cxn ang="0">
-                <a:pos x="connsiteX4" y="connsiteY4"/>
-              </a:cxn>
-              <a:cxn ang="0">
-                <a:pos x="connsiteX5" y="connsiteY5"/>
-              </a:cxn>
-              <a:cxn ang="0">
-                <a:pos x="connsiteX6" y="connsiteY6"/>
-              </a:cxn>
-            </a:cxnLst>
-            <a:rect l="l" t="t" r="r" b="b"/>
-            <a:pathLst>
-              <a:path w="3035431" h="895546">
-                <a:moveTo>
-                  <a:pt x="1414021" y="414779"/>
-                </a:moveTo>
-                <a:lnTo>
-                  <a:pt x="1461155" y="0"/>
-                </a:lnTo>
-                <a:lnTo>
-                  <a:pt x="3026004" y="37707"/>
-                </a:lnTo>
-                <a:lnTo>
-                  <a:pt x="3035431" y="895546"/>
-                </a:lnTo>
-                <a:lnTo>
-                  <a:pt x="0" y="886120"/>
-                </a:lnTo>
-                <a:lnTo>
-                  <a:pt x="28281" y="414779"/>
-                </a:lnTo>
-                <a:lnTo>
-                  <a:pt x="1414021" y="414779"/>
-                </a:lnTo>
-                <a:close/>
-              </a:path>
-            </a:pathLst>
-          </a:custGeom>
-          <a:noFill/>
-          <a:ln>
-            <a:solidFill>
-              <a:srgbClr val="C00000"/>
-            </a:solidFill>
-          </a:ln>
-        </p:spPr>
-        <p:style>
-          <a:lnRef idx="2">
-            <a:schemeClr val="accent1">
-              <a:shade val="15000"/>
-            </a:schemeClr>
-          </a:lnRef>
-          <a:fillRef idx="1">
-            <a:schemeClr val="accent1"/>
-          </a:fillRef>
-          <a:effectRef idx="0">
-            <a:schemeClr val="accent1"/>
-          </a:effectRef>
-          <a:fontRef idx="minor">
-            <a:schemeClr val="lt1"/>
-          </a:fontRef>
-        </p:style>
-        <p:txBody>
-          <a:bodyPr rtlCol="0" anchor="ctr"/>
-          <a:lstStyle/>
-          <a:p>
-            <a:pPr algn="ctr"/>
-            <a:endParaRPr lang="en-CH"/>
-          </a:p>
-        </p:txBody>
-      </p:sp>
-      <p:cxnSp>
-        <p:nvCxnSpPr>
-          <p:cNvPr id="17" name="Straight Arrow Connector 16">
-            <a:extLst>
-              <a:ext uri="{FF2B5EF4-FFF2-40B4-BE49-F238E27FC236}">
-                <a16:creationId xmlns:a16="http://schemas.microsoft.com/office/drawing/2014/main" id="{45635CBD-C415-AE5A-CBC9-7E6E4430A251}"/>
-              </a:ext>
-            </a:extLst>
-          </p:cNvPr>
-          <p:cNvCxnSpPr>
-            <a:cxnSpLocks/>
-          </p:cNvCxnSpPr>
-          <p:nvPr/>
-        </p:nvCxnSpPr>
-        <p:spPr>
-          <a:xfrm flipV="1">
-            <a:off x="6146276" y="1423447"/>
-            <a:ext cx="565609" cy="80128"/>
-          </a:xfrm>
-          <a:prstGeom prst="straightConnector1">
-            <a:avLst/>
-          </a:prstGeom>
-          <a:ln>
-            <a:solidFill>
-              <a:srgbClr val="C00000"/>
-            </a:solidFill>
-            <a:tailEnd type="triangle"/>
-          </a:ln>
-        </p:spPr>
-        <p:style>
-          <a:lnRef idx="2">
-            <a:schemeClr val="accent1"/>
-          </a:lnRef>
-          <a:fillRef idx="0">
-            <a:schemeClr val="accent1"/>
-          </a:fillRef>
-          <a:effectRef idx="1">
-            <a:schemeClr val="accent1"/>
-          </a:effectRef>
-          <a:fontRef idx="minor">
-            <a:schemeClr val="tx1"/>
-          </a:fontRef>
-        </p:style>
-      </p:cxnSp>
-      <p:sp>
-        <p:nvSpPr>
-          <p:cNvPr id="19" name="TextBox 18">
-            <a:extLst>
-              <a:ext uri="{FF2B5EF4-FFF2-40B4-BE49-F238E27FC236}">
-                <a16:creationId xmlns:a16="http://schemas.microsoft.com/office/drawing/2014/main" id="{F925F4B2-19E2-80F5-14D4-83ADCC3514CD}"/>
-              </a:ext>
-            </a:extLst>
-          </p:cNvPr>
-          <p:cNvSpPr txBox="1"/>
-          <p:nvPr/>
-        </p:nvSpPr>
-        <p:spPr>
-          <a:xfrm>
-            <a:off x="6711885" y="1238781"/>
-            <a:ext cx="1701620" cy="369332"/>
-          </a:xfrm>
-          <a:prstGeom prst="rect">
-            <a:avLst/>
-          </a:prstGeom>
-          <a:noFill/>
-        </p:spPr>
-        <p:txBody>
-          <a:bodyPr wrap="none" rtlCol="0">
-            <a:spAutoFit/>
-          </a:bodyPr>
-          <a:lstStyle/>
-          <a:p>
-            <a:r>
-              <a:rPr lang="en-US" dirty="0"/>
-              <a:t>Neural network</a:t>
-            </a:r>
-            <a:endParaRPr lang="en-CH" dirty="0"/>
-          </a:p>
-        </p:txBody>
-      </p:sp>
-      <p:sp>
-        <p:nvSpPr>
-          <p:cNvPr id="20" name="TextBox 19">
-            <a:extLst>
-              <a:ext uri="{FF2B5EF4-FFF2-40B4-BE49-F238E27FC236}">
-                <a16:creationId xmlns:a16="http://schemas.microsoft.com/office/drawing/2014/main" id="{E13A66CF-5C59-F3E6-DCF5-DB12CF29EB76}"/>
-              </a:ext>
-            </a:extLst>
-          </p:cNvPr>
-          <p:cNvSpPr txBox="1"/>
-          <p:nvPr/>
-        </p:nvSpPr>
-        <p:spPr>
-          <a:xfrm>
-            <a:off x="292231" y="2626308"/>
-            <a:ext cx="8748074" cy="2800767"/>
-          </a:xfrm>
-          <a:prstGeom prst="rect">
-            <a:avLst/>
-          </a:prstGeom>
-          <a:noFill/>
-        </p:spPr>
-        <p:txBody>
-          <a:bodyPr wrap="square" rtlCol="0">
-            <a:spAutoFit/>
-          </a:bodyPr>
-          <a:lstStyle/>
-          <a:p>
-            <a:r>
-              <a:rPr lang="en-US" dirty="0"/>
-              <a:t>Objectives of the NN :</a:t>
-            </a:r>
-          </a:p>
-          <a:p>
-            <a:pPr marL="285750" indent="-285750">
-              <a:buFontTx/>
-              <a:buChar char="-"/>
-            </a:pPr>
-            <a:r>
-              <a:rPr lang="en-US" dirty="0"/>
-              <a:t>Match a test sample with a type of microplastic. </a:t>
-            </a:r>
-          </a:p>
-          <a:p>
-            <a:pPr lvl="1"/>
-            <a:r>
-              <a:rPr lang="en-US" sz="1200" dirty="0"/>
-              <a:t>Problem: each type of microplastic is represented by only one spectrum in the DB or has many samples but they differ a lot. Without better data for now the NN can only aim to match to a spectrum and not to the type of microplastic. </a:t>
-            </a:r>
-          </a:p>
-          <a:p>
-            <a:pPr lvl="1"/>
-            <a:r>
-              <a:rPr lang="en-US" sz="1200" dirty="0"/>
-              <a:t>-&gt;make more data with our spectrometer ?</a:t>
-            </a:r>
-            <a:endParaRPr lang="en-US" dirty="0"/>
-          </a:p>
-          <a:p>
-            <a:r>
-              <a:rPr lang="en-US" dirty="0"/>
-              <a:t>-     Give percentages of similarity for many samples.</a:t>
-            </a:r>
-          </a:p>
-          <a:p>
-            <a:endParaRPr lang="en-US" dirty="0"/>
-          </a:p>
-          <a:p>
-            <a:r>
-              <a:rPr lang="en-US" dirty="0"/>
-              <a:t>Inputs of the NN :</a:t>
-            </a:r>
-          </a:p>
-          <a:p>
-            <a:pPr marL="285750" indent="-285750">
-              <a:buFontTx/>
-              <a:buChar char="-"/>
-            </a:pPr>
-            <a:r>
-              <a:rPr lang="en-US" dirty="0"/>
-              <a:t>Samples </a:t>
-            </a:r>
-            <a:r>
-              <a:rPr lang="en-US" sz="1400" dirty="0"/>
-              <a:t>(ideally many samples for each plastic, in different conditions, different ages (only have this in one database))</a:t>
-            </a:r>
-          </a:p>
-          <a:p>
-            <a:pPr marL="285750" indent="-285750">
-              <a:buFontTx/>
-              <a:buChar char="-"/>
-            </a:pPr>
-            <a:endParaRPr lang="en-US" dirty="0"/>
-          </a:p>
-        </p:txBody>
-      </p:sp>
-      <p:cxnSp>
-        <p:nvCxnSpPr>
-          <p:cNvPr id="24" name="Straight Arrow Connector 23">
-            <a:extLst>
-              <a:ext uri="{FF2B5EF4-FFF2-40B4-BE49-F238E27FC236}">
-                <a16:creationId xmlns:a16="http://schemas.microsoft.com/office/drawing/2014/main" id="{99F90642-A930-A80C-FB89-7B03B1151150}"/>
-              </a:ext>
-            </a:extLst>
-          </p:cNvPr>
-          <p:cNvCxnSpPr>
-            <a:cxnSpLocks/>
-          </p:cNvCxnSpPr>
-          <p:nvPr/>
-        </p:nvCxnSpPr>
-        <p:spPr>
-          <a:xfrm flipV="1">
-            <a:off x="3799002" y="772998"/>
-            <a:ext cx="197963" cy="377072"/>
-          </a:xfrm>
-          <a:prstGeom prst="straightConnector1">
-            <a:avLst/>
-          </a:prstGeom>
-          <a:ln>
-            <a:solidFill>
-              <a:schemeClr val="accent6"/>
-            </a:solidFill>
-            <a:tailEnd type="triangle"/>
-          </a:ln>
-        </p:spPr>
-        <p:style>
-          <a:lnRef idx="2">
-            <a:schemeClr val="accent1"/>
-          </a:lnRef>
-          <a:fillRef idx="0">
-            <a:schemeClr val="accent1"/>
-          </a:fillRef>
-          <a:effectRef idx="1">
-            <a:schemeClr val="accent1"/>
-          </a:effectRef>
-          <a:fontRef idx="minor">
-            <a:schemeClr val="tx1"/>
-          </a:fontRef>
-        </p:style>
-      </p:cxnSp>
-      <p:sp>
-        <p:nvSpPr>
-          <p:cNvPr id="26" name="TextBox 25">
-            <a:extLst>
-              <a:ext uri="{FF2B5EF4-FFF2-40B4-BE49-F238E27FC236}">
-                <a16:creationId xmlns:a16="http://schemas.microsoft.com/office/drawing/2014/main" id="{BF2C5C1B-3612-5D59-96D5-92E0ED186CDF}"/>
-              </a:ext>
-            </a:extLst>
-          </p:cNvPr>
-          <p:cNvSpPr txBox="1"/>
-          <p:nvPr/>
-        </p:nvSpPr>
-        <p:spPr>
-          <a:xfrm>
-            <a:off x="3421930" y="465221"/>
-            <a:ext cx="2831836" cy="307777"/>
-          </a:xfrm>
-          <a:prstGeom prst="rect">
-            <a:avLst/>
-          </a:prstGeom>
-          <a:noFill/>
-        </p:spPr>
-        <p:txBody>
-          <a:bodyPr wrap="square" rtlCol="0">
-            <a:spAutoFit/>
-          </a:bodyPr>
-          <a:lstStyle/>
-          <a:p>
-            <a:r>
-              <a:rPr lang="en-US" sz="1400" dirty="0"/>
-              <a:t>Can be computed in 4 algorithms</a:t>
-            </a:r>
-            <a:endParaRPr lang="en-CH" sz="1400" dirty="0"/>
-          </a:p>
-        </p:txBody>
-      </p:sp>
-      <p:pic>
-        <p:nvPicPr>
-          <p:cNvPr id="28" name="Picture 27">
-            <a:extLst>
-              <a:ext uri="{FF2B5EF4-FFF2-40B4-BE49-F238E27FC236}">
-                <a16:creationId xmlns:a16="http://schemas.microsoft.com/office/drawing/2014/main" id="{482B0694-479F-86C1-3AB2-6057A08B9C0B}"/>
-              </a:ext>
-            </a:extLst>
-          </p:cNvPr>
-          <p:cNvPicPr>
-            <a:picLocks noChangeAspect="1"/>
-          </p:cNvPicPr>
-          <p:nvPr/>
-        </p:nvPicPr>
-        <p:blipFill>
-          <a:blip r:embed="rId3"/>
-          <a:stretch>
-            <a:fillRect/>
-          </a:stretch>
-        </p:blipFill>
-        <p:spPr>
-          <a:xfrm>
-            <a:off x="8228010" y="4958499"/>
-            <a:ext cx="3892200" cy="1811422"/>
-          </a:xfrm>
-          <a:prstGeom prst="rect">
-            <a:avLst/>
-          </a:prstGeom>
-        </p:spPr>
-      </p:pic>
-      <p:cxnSp>
-        <p:nvCxnSpPr>
-          <p:cNvPr id="29" name="Straight Arrow Connector 28">
-            <a:extLst>
-              <a:ext uri="{FF2B5EF4-FFF2-40B4-BE49-F238E27FC236}">
-                <a16:creationId xmlns:a16="http://schemas.microsoft.com/office/drawing/2014/main" id="{85B1C022-777E-4468-3BCA-8163F9CF9ED7}"/>
-              </a:ext>
-            </a:extLst>
-          </p:cNvPr>
-          <p:cNvCxnSpPr>
-            <a:cxnSpLocks/>
-          </p:cNvCxnSpPr>
-          <p:nvPr/>
-        </p:nvCxnSpPr>
-        <p:spPr>
-          <a:xfrm>
-            <a:off x="7562695" y="6221691"/>
-            <a:ext cx="665315" cy="0"/>
-          </a:xfrm>
-          <a:prstGeom prst="straightConnector1">
-            <a:avLst/>
-          </a:prstGeom>
-          <a:ln>
-            <a:solidFill>
-              <a:schemeClr val="accent6"/>
-            </a:solidFill>
-            <a:tailEnd type="triangle"/>
-          </a:ln>
-        </p:spPr>
-        <p:style>
-          <a:lnRef idx="2">
-            <a:schemeClr val="accent1"/>
-          </a:lnRef>
-          <a:fillRef idx="0">
-            <a:schemeClr val="accent1"/>
-          </a:fillRef>
-          <a:effectRef idx="1">
-            <a:schemeClr val="accent1"/>
-          </a:effectRef>
-          <a:fontRef idx="minor">
-            <a:schemeClr val="tx1"/>
-          </a:fontRef>
-        </p:style>
-      </p:cxnSp>
-      <p:sp>
-        <p:nvSpPr>
-          <p:cNvPr id="32" name="TextBox 31">
-            <a:extLst>
-              <a:ext uri="{FF2B5EF4-FFF2-40B4-BE49-F238E27FC236}">
-                <a16:creationId xmlns:a16="http://schemas.microsoft.com/office/drawing/2014/main" id="{1B5DC805-125D-F8AB-9734-FCC518BA0285}"/>
-              </a:ext>
-            </a:extLst>
-          </p:cNvPr>
-          <p:cNvSpPr txBox="1"/>
-          <p:nvPr/>
-        </p:nvSpPr>
-        <p:spPr>
-          <a:xfrm>
-            <a:off x="5825250" y="5860494"/>
-            <a:ext cx="2070102" cy="646331"/>
-          </a:xfrm>
-          <a:prstGeom prst="rect">
-            <a:avLst/>
-          </a:prstGeom>
-          <a:noFill/>
-        </p:spPr>
-        <p:txBody>
-          <a:bodyPr wrap="square" rtlCol="0">
-            <a:spAutoFit/>
-          </a:bodyPr>
-          <a:lstStyle/>
-          <a:p>
-            <a:r>
-              <a:rPr lang="en-US" sz="1200" dirty="0"/>
-              <a:t>Wil add a dropdown menu here to choose between peak matching or NN</a:t>
-            </a:r>
-            <a:endParaRPr lang="en-CH" sz="1200" dirty="0"/>
-          </a:p>
-        </p:txBody>
-      </p:sp>
-    </p:spTree>
-    <p:extLst>
-      <p:ext uri="{BB962C8B-B14F-4D97-AF65-F5344CB8AC3E}">
-        <p14:creationId xmlns:p14="http://schemas.microsoft.com/office/powerpoint/2010/main" val="987289868"/>
-      </p:ext>
-    </p:extLst>
-  </p:cSld>
-  <p:clrMapOvr>
-    <a:masterClrMapping/>
-  </p:clrMapOvr>
-</p:sld>
-</file>
-
-<file path=ppt/slides/slide2.xml><?xml version="1.0" encoding="utf-8"?>
-<p:sld xmlns:a="http://schemas.openxmlformats.org/drawingml/2006/main" xmlns:r="http://schemas.openxmlformats.org/officeDocument/2006/relationships" xmlns:p="http://schemas.openxmlformats.org/presentationml/2006/main">
-  <p:cSld>
-    <p:spTree>
-      <p:nvGrpSpPr>
-        <p:cNvPr id="1" name=""/>
-        <p:cNvGrpSpPr/>
-        <p:nvPr/>
-      </p:nvGrpSpPr>
-      <p:grpSpPr>
-        <a:xfrm>
-          <a:off x="0" y="0"/>
-          <a:ext cx="0" cy="0"/>
-          <a:chOff x="0" y="0"/>
-          <a:chExt cx="0" cy="0"/>
-        </a:xfrm>
-      </p:grpSpPr>
-      <p:sp>
-        <p:nvSpPr>
-          <p:cNvPr id="2" name="Title 1">
-            <a:extLst>
-              <a:ext uri="{FF2B5EF4-FFF2-40B4-BE49-F238E27FC236}">
-                <a16:creationId xmlns:a16="http://schemas.microsoft.com/office/drawing/2014/main" id="{2EB2F19F-42E1-E172-6863-E2FA4D1FD1A0}"/>
-              </a:ext>
-            </a:extLst>
-          </p:cNvPr>
-          <p:cNvSpPr>
-            <a:spLocks noGrp="1"/>
-          </p:cNvSpPr>
-          <p:nvPr>
-            <p:ph type="title"/>
-          </p:nvPr>
-        </p:nvSpPr>
-        <p:spPr>
-          <a:xfrm>
-            <a:off x="0" y="-48642"/>
-            <a:ext cx="6260184" cy="1029030"/>
-          </a:xfrm>
-        </p:spPr>
-        <p:txBody>
-          <a:bodyPr>
-            <a:normAutofit/>
-          </a:bodyPr>
-          <a:lstStyle/>
-          <a:p>
-            <a:r>
-              <a:rPr lang="en-US" sz="3200" dirty="0"/>
-              <a:t>Structure of NN</a:t>
-            </a:r>
-            <a:endParaRPr lang="en-CH" sz="3200" dirty="0"/>
-          </a:p>
-        </p:txBody>
-      </p:sp>
-      <p:sp>
-        <p:nvSpPr>
-          <p:cNvPr id="3" name="Content Placeholder 2">
-            <a:extLst>
-              <a:ext uri="{FF2B5EF4-FFF2-40B4-BE49-F238E27FC236}">
-                <a16:creationId xmlns:a16="http://schemas.microsoft.com/office/drawing/2014/main" id="{84A617DD-62F8-33A5-B283-65431ADA5BEF}"/>
-              </a:ext>
-            </a:extLst>
-          </p:cNvPr>
-          <p:cNvSpPr>
-            <a:spLocks noGrp="1"/>
-          </p:cNvSpPr>
-          <p:nvPr>
-            <p:ph idx="1"/>
-          </p:nvPr>
-        </p:nvSpPr>
-        <p:spPr>
-          <a:xfrm>
-            <a:off x="91406" y="1415394"/>
-            <a:ext cx="6505280" cy="4351338"/>
-          </a:xfrm>
-        </p:spPr>
-        <p:txBody>
-          <a:bodyPr>
-            <a:normAutofit/>
-          </a:bodyPr>
-          <a:lstStyle/>
-          <a:p>
-            <a:r>
-              <a:rPr lang="en-US" sz="1600" dirty="0"/>
-              <a:t>Datapoints are not aligned (not the same values of wavenumber are measured each time) </a:t>
-            </a:r>
-            <a:r>
-              <a:rPr lang="en-US" sz="1400" dirty="0"/>
-              <a:t>-&gt;work on “joining the points with a line and then taking the value of that line for fixed points”</a:t>
-            </a:r>
-          </a:p>
-          <a:p>
-            <a:endParaRPr lang="en-US" sz="1400" dirty="0"/>
-          </a:p>
-          <a:p>
-            <a:r>
-              <a:rPr lang="en-US" sz="1400" dirty="0"/>
-              <a:t>Convolutional first layer is necessary to capture (local steep up (or down), local peak at X intensity value, local noise at points of no interest)</a:t>
-            </a:r>
-          </a:p>
-          <a:p>
-            <a:endParaRPr lang="en-US" sz="1400" dirty="0"/>
-          </a:p>
-          <a:p>
-            <a:r>
-              <a:rPr lang="en-US" sz="1400" dirty="0"/>
-              <a:t>Macro feature layers will be able to activate one or more nodes of the output layer so samples containing multiple plastics will be detected.</a:t>
-            </a:r>
-          </a:p>
-          <a:p>
-            <a:pPr marL="0" indent="0">
-              <a:buNone/>
-            </a:pPr>
-            <a:endParaRPr lang="en-US" sz="1200" dirty="0"/>
-          </a:p>
-          <a:p>
-            <a:pPr marL="0" indent="0">
-              <a:buNone/>
-            </a:pPr>
-            <a:endParaRPr lang="en-US" sz="1200" dirty="0"/>
-          </a:p>
-          <a:p>
-            <a:pPr marL="0" indent="0">
-              <a:buNone/>
-            </a:pPr>
-            <a:r>
-              <a:rPr lang="en-US" sz="1200" dirty="0"/>
-              <a:t>-&gt; I will understand what macro features layers identify only during the training process</a:t>
-            </a:r>
-            <a:endParaRPr lang="en-US" sz="1100" dirty="0"/>
-          </a:p>
-          <a:p>
-            <a:endParaRPr lang="en-US" sz="1100" dirty="0"/>
-          </a:p>
-          <a:p>
-            <a:pPr marL="0" indent="0">
-              <a:buNone/>
-            </a:pPr>
-            <a:r>
-              <a:rPr lang="en-US" sz="1100" dirty="0"/>
-              <a:t>-&gt; I will be trying any combination of layers, regressors, validations, etc. </a:t>
-            </a:r>
-            <a:endParaRPr lang="en-CH" sz="1200" dirty="0"/>
-          </a:p>
-        </p:txBody>
-      </p:sp>
-      <p:pic>
-        <p:nvPicPr>
-          <p:cNvPr id="5" name="Picture 4">
-            <a:extLst>
-              <a:ext uri="{FF2B5EF4-FFF2-40B4-BE49-F238E27FC236}">
-                <a16:creationId xmlns:a16="http://schemas.microsoft.com/office/drawing/2014/main" id="{D6262436-9280-E02E-9A41-30925C324024}"/>
-              </a:ext>
-            </a:extLst>
-          </p:cNvPr>
-          <p:cNvPicPr>
-            <a:picLocks noChangeAspect="1"/>
-          </p:cNvPicPr>
-          <p:nvPr/>
-        </p:nvPicPr>
-        <p:blipFill>
-          <a:blip r:embed="rId2"/>
-          <a:stretch>
-            <a:fillRect/>
-          </a:stretch>
-        </p:blipFill>
-        <p:spPr>
-          <a:xfrm>
-            <a:off x="8129134" y="2082406"/>
-            <a:ext cx="3663798" cy="4670487"/>
-          </a:xfrm>
-          <a:prstGeom prst="rect">
-            <a:avLst/>
-          </a:prstGeom>
-        </p:spPr>
-      </p:pic>
-      <p:cxnSp>
-        <p:nvCxnSpPr>
-          <p:cNvPr id="7" name="Straight Arrow Connector 6">
-            <a:extLst>
-              <a:ext uri="{FF2B5EF4-FFF2-40B4-BE49-F238E27FC236}">
-                <a16:creationId xmlns:a16="http://schemas.microsoft.com/office/drawing/2014/main" id="{B4F4C7F9-687D-51E1-EBDC-4ECC717DB521}"/>
-              </a:ext>
-            </a:extLst>
-          </p:cNvPr>
-          <p:cNvCxnSpPr>
-            <a:cxnSpLocks/>
-          </p:cNvCxnSpPr>
-          <p:nvPr/>
-        </p:nvCxnSpPr>
-        <p:spPr>
-          <a:xfrm>
-            <a:off x="8550111" y="1437646"/>
-            <a:ext cx="197963" cy="523129"/>
-          </a:xfrm>
-          <a:prstGeom prst="straightConnector1">
-            <a:avLst/>
-          </a:prstGeom>
-          <a:ln>
-            <a:tailEnd type="triangle"/>
-          </a:ln>
-        </p:spPr>
-        <p:style>
-          <a:lnRef idx="2">
-            <a:schemeClr val="accent1"/>
-          </a:lnRef>
-          <a:fillRef idx="0">
-            <a:schemeClr val="accent1"/>
-          </a:fillRef>
-          <a:effectRef idx="1">
-            <a:schemeClr val="accent1"/>
-          </a:effectRef>
-          <a:fontRef idx="minor">
-            <a:schemeClr val="tx1"/>
-          </a:fontRef>
-        </p:style>
-      </p:cxnSp>
-      <p:sp>
-        <p:nvSpPr>
-          <p:cNvPr id="9" name="TextBox 8">
-            <a:extLst>
-              <a:ext uri="{FF2B5EF4-FFF2-40B4-BE49-F238E27FC236}">
-                <a16:creationId xmlns:a16="http://schemas.microsoft.com/office/drawing/2014/main" id="{BB1834C3-FAA5-BCF7-237B-7A323A6A260F}"/>
-              </a:ext>
-            </a:extLst>
-          </p:cNvPr>
-          <p:cNvSpPr txBox="1"/>
-          <p:nvPr/>
-        </p:nvSpPr>
-        <p:spPr>
-          <a:xfrm>
-            <a:off x="7854247" y="870935"/>
-            <a:ext cx="1391728" cy="523220"/>
-          </a:xfrm>
-          <a:prstGeom prst="rect">
-            <a:avLst/>
-          </a:prstGeom>
-          <a:noFill/>
-        </p:spPr>
-        <p:txBody>
-          <a:bodyPr wrap="none" rtlCol="0">
-            <a:spAutoFit/>
-          </a:bodyPr>
-          <a:lstStyle/>
-          <a:p>
-            <a:pPr algn="ctr"/>
-            <a:r>
-              <a:rPr lang="en-US" sz="1400" dirty="0"/>
-              <a:t>Datapoints</a:t>
-            </a:r>
-          </a:p>
-          <a:p>
-            <a:pPr algn="ctr"/>
-            <a:r>
-              <a:rPr lang="en-US" sz="1100" dirty="0"/>
-              <a:t>(~3000 per sample)</a:t>
-            </a:r>
-            <a:r>
-              <a:rPr lang="en-US" sz="1400" dirty="0"/>
-              <a:t> </a:t>
-            </a:r>
-            <a:endParaRPr lang="en-CH" sz="1400" dirty="0"/>
-          </a:p>
-        </p:txBody>
-      </p:sp>
-      <p:sp>
-        <p:nvSpPr>
-          <p:cNvPr id="12" name="TextBox 11">
-            <a:extLst>
-              <a:ext uri="{FF2B5EF4-FFF2-40B4-BE49-F238E27FC236}">
-                <a16:creationId xmlns:a16="http://schemas.microsoft.com/office/drawing/2014/main" id="{19A84ADA-11D1-7F41-EC9F-59FCB40A73E4}"/>
-              </a:ext>
-            </a:extLst>
-          </p:cNvPr>
-          <p:cNvSpPr txBox="1"/>
-          <p:nvPr/>
-        </p:nvSpPr>
-        <p:spPr>
-          <a:xfrm>
-            <a:off x="8710925" y="1478054"/>
-            <a:ext cx="1591559" cy="438582"/>
-          </a:xfrm>
-          <a:prstGeom prst="rect">
-            <a:avLst/>
-          </a:prstGeom>
-          <a:noFill/>
-        </p:spPr>
-        <p:txBody>
-          <a:bodyPr wrap="square" rtlCol="0">
-            <a:spAutoFit/>
-          </a:bodyPr>
-          <a:lstStyle/>
-          <a:p>
-            <a:pPr algn="ctr"/>
-            <a:r>
-              <a:rPr lang="en-US" sz="1200" dirty="0"/>
-              <a:t>Vicinity features layer </a:t>
-            </a:r>
-            <a:r>
-              <a:rPr lang="en-US" sz="1050" dirty="0"/>
-              <a:t>(convolutional) </a:t>
-            </a:r>
-            <a:endParaRPr lang="en-CH" sz="1200" dirty="0"/>
-          </a:p>
-        </p:txBody>
-      </p:sp>
-      <p:cxnSp>
-        <p:nvCxnSpPr>
-          <p:cNvPr id="13" name="Straight Arrow Connector 12">
-            <a:extLst>
-              <a:ext uri="{FF2B5EF4-FFF2-40B4-BE49-F238E27FC236}">
-                <a16:creationId xmlns:a16="http://schemas.microsoft.com/office/drawing/2014/main" id="{17956BAC-4728-99FA-FF95-108F1640EFA0}"/>
-              </a:ext>
-            </a:extLst>
-          </p:cNvPr>
-          <p:cNvCxnSpPr>
-            <a:cxnSpLocks/>
-          </p:cNvCxnSpPr>
-          <p:nvPr/>
-        </p:nvCxnSpPr>
-        <p:spPr>
-          <a:xfrm>
-            <a:off x="9506705" y="1960775"/>
-            <a:ext cx="0" cy="780315"/>
-          </a:xfrm>
-          <a:prstGeom prst="straightConnector1">
-            <a:avLst/>
-          </a:prstGeom>
-          <a:ln>
-            <a:tailEnd type="triangle"/>
-          </a:ln>
-        </p:spPr>
-        <p:style>
-          <a:lnRef idx="2">
-            <a:schemeClr val="accent1"/>
-          </a:lnRef>
-          <a:fillRef idx="0">
-            <a:schemeClr val="accent1"/>
-          </a:fillRef>
-          <a:effectRef idx="1">
-            <a:schemeClr val="accent1"/>
-          </a:effectRef>
-          <a:fontRef idx="minor">
-            <a:schemeClr val="tx1"/>
-          </a:fontRef>
-        </p:style>
-      </p:cxnSp>
-      <p:sp>
-        <p:nvSpPr>
-          <p:cNvPr id="15" name="TextBox 14">
-            <a:extLst>
-              <a:ext uri="{FF2B5EF4-FFF2-40B4-BE49-F238E27FC236}">
-                <a16:creationId xmlns:a16="http://schemas.microsoft.com/office/drawing/2014/main" id="{A34C3F70-DFE9-73E1-BC49-B082D061558D}"/>
-              </a:ext>
-            </a:extLst>
-          </p:cNvPr>
-          <p:cNvSpPr txBox="1"/>
-          <p:nvPr/>
-        </p:nvSpPr>
-        <p:spPr>
-          <a:xfrm>
-            <a:off x="9666611" y="1977451"/>
-            <a:ext cx="1197452" cy="830997"/>
-          </a:xfrm>
-          <a:prstGeom prst="rect">
-            <a:avLst/>
-          </a:prstGeom>
-          <a:noFill/>
-        </p:spPr>
-        <p:txBody>
-          <a:bodyPr wrap="square" rtlCol="0">
-            <a:spAutoFit/>
-          </a:bodyPr>
-          <a:lstStyle/>
-          <a:p>
-            <a:pPr algn="ctr"/>
-            <a:r>
-              <a:rPr lang="en-US" sz="1200" dirty="0"/>
-              <a:t>Other macro features layers (as many as necessary)</a:t>
-            </a:r>
-            <a:endParaRPr lang="en-CH" sz="1200" dirty="0"/>
-          </a:p>
-        </p:txBody>
-      </p:sp>
-      <p:cxnSp>
-        <p:nvCxnSpPr>
-          <p:cNvPr id="16" name="Straight Arrow Connector 15">
-            <a:extLst>
-              <a:ext uri="{FF2B5EF4-FFF2-40B4-BE49-F238E27FC236}">
-                <a16:creationId xmlns:a16="http://schemas.microsoft.com/office/drawing/2014/main" id="{E33E788A-ACF4-500F-A98D-DAAE79FC318F}"/>
-              </a:ext>
-            </a:extLst>
-          </p:cNvPr>
-          <p:cNvCxnSpPr>
-            <a:cxnSpLocks/>
-          </p:cNvCxnSpPr>
-          <p:nvPr/>
-        </p:nvCxnSpPr>
-        <p:spPr>
-          <a:xfrm>
-            <a:off x="10265337" y="2808448"/>
-            <a:ext cx="0" cy="780315"/>
-          </a:xfrm>
-          <a:prstGeom prst="straightConnector1">
-            <a:avLst/>
-          </a:prstGeom>
-          <a:ln>
-            <a:tailEnd type="triangle"/>
-          </a:ln>
-        </p:spPr>
-        <p:style>
-          <a:lnRef idx="2">
-            <a:schemeClr val="accent1"/>
-          </a:lnRef>
-          <a:fillRef idx="0">
-            <a:schemeClr val="accent1"/>
-          </a:fillRef>
-          <a:effectRef idx="1">
-            <a:schemeClr val="accent1"/>
-          </a:effectRef>
-          <a:fontRef idx="minor">
-            <a:schemeClr val="tx1"/>
-          </a:fontRef>
-        </p:style>
-      </p:cxnSp>
-      <p:cxnSp>
-        <p:nvCxnSpPr>
-          <p:cNvPr id="17" name="Straight Arrow Connector 16">
-            <a:extLst>
-              <a:ext uri="{FF2B5EF4-FFF2-40B4-BE49-F238E27FC236}">
-                <a16:creationId xmlns:a16="http://schemas.microsoft.com/office/drawing/2014/main" id="{928FA4D6-F2FB-D8F2-EB92-E698155F7B56}"/>
-              </a:ext>
-            </a:extLst>
-          </p:cNvPr>
-          <p:cNvCxnSpPr>
-            <a:cxnSpLocks/>
-          </p:cNvCxnSpPr>
-          <p:nvPr/>
-        </p:nvCxnSpPr>
-        <p:spPr>
-          <a:xfrm flipH="1">
-            <a:off x="10950577" y="2234153"/>
-            <a:ext cx="371015" cy="734751"/>
-          </a:xfrm>
-          <a:prstGeom prst="straightConnector1">
-            <a:avLst/>
-          </a:prstGeom>
-          <a:ln>
-            <a:tailEnd type="triangle"/>
-          </a:ln>
-        </p:spPr>
-        <p:style>
-          <a:lnRef idx="2">
-            <a:schemeClr val="accent1"/>
-          </a:lnRef>
-          <a:fillRef idx="0">
-            <a:schemeClr val="accent1"/>
-          </a:fillRef>
-          <a:effectRef idx="1">
-            <a:schemeClr val="accent1"/>
-          </a:effectRef>
-          <a:fontRef idx="minor">
-            <a:schemeClr val="tx1"/>
-          </a:fontRef>
-        </p:style>
-      </p:cxnSp>
-      <p:sp>
-        <p:nvSpPr>
-          <p:cNvPr id="20" name="TextBox 19">
-            <a:extLst>
-              <a:ext uri="{FF2B5EF4-FFF2-40B4-BE49-F238E27FC236}">
-                <a16:creationId xmlns:a16="http://schemas.microsoft.com/office/drawing/2014/main" id="{FFE81F37-7D48-79D4-2498-72C9A3686BF0}"/>
-              </a:ext>
-            </a:extLst>
-          </p:cNvPr>
-          <p:cNvSpPr txBox="1"/>
-          <p:nvPr/>
-        </p:nvSpPr>
-        <p:spPr>
-          <a:xfrm>
-            <a:off x="10755073" y="1207394"/>
-            <a:ext cx="1235815" cy="830997"/>
-          </a:xfrm>
-          <a:prstGeom prst="rect">
-            <a:avLst/>
-          </a:prstGeom>
-          <a:noFill/>
-        </p:spPr>
-        <p:txBody>
-          <a:bodyPr wrap="square" rtlCol="0">
-            <a:spAutoFit/>
-          </a:bodyPr>
-          <a:lstStyle/>
-          <a:p>
-            <a:pPr algn="ctr"/>
-            <a:r>
-              <a:rPr lang="en-US" sz="1200" dirty="0"/>
-              <a:t>Output, microplastics or singular train spectra</a:t>
-            </a:r>
-            <a:endParaRPr lang="en-CH" sz="1200" dirty="0"/>
-          </a:p>
-        </p:txBody>
-      </p:sp>
-    </p:spTree>
-    <p:extLst>
-      <p:ext uri="{BB962C8B-B14F-4D97-AF65-F5344CB8AC3E}">
-        <p14:creationId xmlns:p14="http://schemas.microsoft.com/office/powerpoint/2010/main" val="4183032883"/>
-      </p:ext>
-    </p:extLst>
-  </p:cSld>
-  <p:clrMapOvr>
-    <a:masterClrMapping/>
-  </p:clrMapOvr>
-</p:sld>
-</file>
-
-<file path=ppt/slides/slide3.xml><?xml version="1.0" encoding="utf-8"?>
-<p:sld xmlns:a="http://schemas.openxmlformats.org/drawingml/2006/main" xmlns:r="http://schemas.openxmlformats.org/officeDocument/2006/relationships" xmlns:p="http://schemas.openxmlformats.org/presentationml/2006/main">
-  <p:cSld>
-    <p:spTree>
-      <p:nvGrpSpPr>
-        <p:cNvPr id="1" name=""/>
-        <p:cNvGrpSpPr/>
-        <p:nvPr/>
-      </p:nvGrpSpPr>
-      <p:grpSpPr>
-        <a:xfrm>
-          <a:off x="0" y="0"/>
-          <a:ext cx="0" cy="0"/>
-          <a:chOff x="0" y="0"/>
-          <a:chExt cx="0" cy="0"/>
-        </a:xfrm>
-      </p:grpSpPr>
-      <p:sp>
-        <p:nvSpPr>
-          <p:cNvPr id="2" name="Title 1">
-            <a:extLst>
-              <a:ext uri="{FF2B5EF4-FFF2-40B4-BE49-F238E27FC236}">
-                <a16:creationId xmlns:a16="http://schemas.microsoft.com/office/drawing/2014/main" id="{ACB6D437-4EE7-BBBA-D74C-BDD5B79C04C5}"/>
-              </a:ext>
-            </a:extLst>
-          </p:cNvPr>
-          <p:cNvSpPr>
-            <a:spLocks noGrp="1"/>
-          </p:cNvSpPr>
-          <p:nvPr>
-            <p:ph type="title"/>
-          </p:nvPr>
-        </p:nvSpPr>
-        <p:spPr>
-          <a:xfrm>
-            <a:off x="0" y="-291367"/>
-            <a:ext cx="10515600" cy="1325563"/>
-          </a:xfrm>
-        </p:spPr>
-        <p:txBody>
-          <a:bodyPr>
-            <a:normAutofit/>
-          </a:bodyPr>
-          <a:lstStyle/>
-          <a:p>
-            <a:r>
-              <a:rPr lang="en-US" sz="3600" dirty="0" err="1"/>
-              <a:t>Pytorch</a:t>
-            </a:r>
-            <a:endParaRPr lang="en-CH" sz="3600" dirty="0"/>
-          </a:p>
-        </p:txBody>
-      </p:sp>
-      <p:sp>
-        <p:nvSpPr>
-          <p:cNvPr id="3" name="Content Placeholder 2">
-            <a:extLst>
-              <a:ext uri="{FF2B5EF4-FFF2-40B4-BE49-F238E27FC236}">
-                <a16:creationId xmlns:a16="http://schemas.microsoft.com/office/drawing/2014/main" id="{C6316E40-4547-D9AB-25F3-79DB5647C4BC}"/>
-              </a:ext>
-            </a:extLst>
-          </p:cNvPr>
-          <p:cNvSpPr>
-            <a:spLocks noGrp="1"/>
-          </p:cNvSpPr>
-          <p:nvPr>
-            <p:ph idx="1"/>
-          </p:nvPr>
-        </p:nvSpPr>
-        <p:spPr>
-          <a:xfrm>
-            <a:off x="7116117" y="340518"/>
-            <a:ext cx="4609158" cy="6176963"/>
-          </a:xfrm>
-        </p:spPr>
-        <p:txBody>
-          <a:bodyPr>
-            <a:normAutofit/>
-          </a:bodyPr>
-          <a:lstStyle/>
-          <a:p>
-            <a:pPr marL="0" indent="0">
-              <a:buNone/>
-            </a:pPr>
-            <a:r>
-              <a:rPr lang="fr-CH" sz="1600" dirty="0"/>
-              <a:t>-&gt; </a:t>
-            </a:r>
-            <a:r>
-              <a:rPr lang="fr-CH" sz="1600" dirty="0" err="1"/>
-              <a:t>I’m</a:t>
-            </a:r>
-            <a:r>
-              <a:rPr lang="fr-CH" sz="1600" dirty="0"/>
-              <a:t> not sure of </a:t>
-            </a:r>
-            <a:r>
-              <a:rPr lang="fr-CH" sz="1600" dirty="0" err="1"/>
-              <a:t>any</a:t>
-            </a:r>
-            <a:r>
-              <a:rPr lang="fr-CH" sz="1600" dirty="0"/>
-              <a:t> of the </a:t>
-            </a:r>
-            <a:r>
-              <a:rPr lang="fr-CH" sz="1600" dirty="0" err="1"/>
-              <a:t>layers</a:t>
-            </a:r>
-            <a:r>
-              <a:rPr lang="fr-CH" sz="1600" dirty="0"/>
-              <a:t> in the middle</a:t>
-            </a:r>
-          </a:p>
-          <a:p>
-            <a:pPr marL="0" indent="0">
-              <a:buNone/>
-            </a:pPr>
-            <a:r>
-              <a:rPr lang="fr-CH" sz="1600" dirty="0"/>
-              <a:t>-&gt; Dense </a:t>
-            </a:r>
-            <a:r>
-              <a:rPr lang="fr-CH" sz="1600" dirty="0" err="1"/>
-              <a:t>fully</a:t>
-            </a:r>
-            <a:r>
-              <a:rPr lang="fr-CH" sz="1600" dirty="0"/>
-              <a:t> </a:t>
-            </a:r>
-            <a:r>
-              <a:rPr lang="fr-CH" sz="1600" dirty="0" err="1"/>
-              <a:t>connected</a:t>
-            </a:r>
-            <a:r>
-              <a:rPr lang="fr-CH" sz="1600" dirty="0"/>
-              <a:t> </a:t>
-            </a:r>
-            <a:r>
-              <a:rPr lang="fr-CH" sz="1600" dirty="0" err="1"/>
-              <a:t>layers</a:t>
-            </a:r>
-            <a:r>
-              <a:rPr lang="fr-CH" sz="1600" dirty="0"/>
-              <a:t> at the end </a:t>
-            </a:r>
-            <a:r>
-              <a:rPr lang="fr-CH" sz="1600" dirty="0" err="1"/>
-              <a:t>because</a:t>
-            </a:r>
-            <a:r>
-              <a:rPr lang="fr-CH" sz="1600" dirty="0"/>
-              <a:t> </a:t>
-            </a:r>
-            <a:r>
-              <a:rPr lang="fr-CH" sz="1600" dirty="0" err="1"/>
-              <a:t>peaks</a:t>
-            </a:r>
-            <a:r>
-              <a:rPr lang="fr-CH" sz="1600" dirty="0"/>
-              <a:t> -&gt; plastic(s)</a:t>
-            </a:r>
-            <a:endParaRPr lang="en-CH" sz="1600" dirty="0"/>
-          </a:p>
-        </p:txBody>
-      </p:sp>
-      <p:pic>
-        <p:nvPicPr>
-          <p:cNvPr id="6" name="Picture 5">
-            <a:extLst>
-              <a:ext uri="{FF2B5EF4-FFF2-40B4-BE49-F238E27FC236}">
-                <a16:creationId xmlns:a16="http://schemas.microsoft.com/office/drawing/2014/main" id="{3E24C554-B967-725E-1C95-6D43CDACDFEA}"/>
-              </a:ext>
-            </a:extLst>
-          </p:cNvPr>
-          <p:cNvPicPr>
-            <a:picLocks noChangeAspect="1"/>
-          </p:cNvPicPr>
-          <p:nvPr/>
-        </p:nvPicPr>
-        <p:blipFill>
-          <a:blip r:embed="rId2"/>
-          <a:stretch>
-            <a:fillRect/>
-          </a:stretch>
-        </p:blipFill>
-        <p:spPr>
-          <a:xfrm>
-            <a:off x="185738" y="990258"/>
-            <a:ext cx="6744641" cy="4877481"/>
-          </a:xfrm>
-          <a:prstGeom prst="rect">
-            <a:avLst/>
-          </a:prstGeom>
-        </p:spPr>
-      </p:pic>
-    </p:spTree>
-    <p:extLst>
-      <p:ext uri="{BB962C8B-B14F-4D97-AF65-F5344CB8AC3E}">
-        <p14:creationId xmlns:p14="http://schemas.microsoft.com/office/powerpoint/2010/main" val="838513766"/>
-      </p:ext>
-    </p:extLst>
-  </p:cSld>
-  <p:clrMapOvr>
-    <a:masterClrMapping/>
-  </p:clrMapOvr>
-</p:sld>
-</file>
-
-<file path=ppt/slides/slide4.xml><?xml version="1.0" encoding="utf-8"?>
-<p:sld xmlns:a="http://schemas.openxmlformats.org/drawingml/2006/main" xmlns:r="http://schemas.openxmlformats.org/officeDocument/2006/relationships" xmlns:p="http://schemas.openxmlformats.org/presentationml/2006/main">
-  <p:cSld>
-    <p:spTree>
-      <p:nvGrpSpPr>
-        <p:cNvPr id="1" name=""/>
-        <p:cNvGrpSpPr/>
-        <p:nvPr/>
-      </p:nvGrpSpPr>
-      <p:grpSpPr>
-        <a:xfrm>
-          <a:off x="0" y="0"/>
-          <a:ext cx="0" cy="0"/>
-          <a:chOff x="0" y="0"/>
-          <a:chExt cx="0" cy="0"/>
-        </a:xfrm>
-      </p:grpSpPr>
-      <p:sp>
-        <p:nvSpPr>
-          <p:cNvPr id="2" name="Title 1">
-            <a:extLst>
-              <a:ext uri="{FF2B5EF4-FFF2-40B4-BE49-F238E27FC236}">
-                <a16:creationId xmlns:a16="http://schemas.microsoft.com/office/drawing/2014/main" id="{5C047A58-D5AA-CF38-B086-95D01E2B35D6}"/>
-              </a:ext>
-            </a:extLst>
-          </p:cNvPr>
-          <p:cNvSpPr>
-            <a:spLocks noGrp="1"/>
-          </p:cNvSpPr>
-          <p:nvPr>
-            <p:ph type="title"/>
-          </p:nvPr>
-        </p:nvSpPr>
-        <p:spPr/>
-        <p:txBody>
-          <a:bodyPr/>
-          <a:lstStyle/>
-          <a:p>
-            <a:endParaRPr lang="en-US"/>
-          </a:p>
-        </p:txBody>
-      </p:sp>
-      <p:sp>
-        <p:nvSpPr>
-          <p:cNvPr id="3" name="Content Placeholder 2">
-            <a:extLst>
-              <a:ext uri="{FF2B5EF4-FFF2-40B4-BE49-F238E27FC236}">
-                <a16:creationId xmlns:a16="http://schemas.microsoft.com/office/drawing/2014/main" id="{D7748108-4169-790D-C3E5-EF12976B8C5E}"/>
-              </a:ext>
-            </a:extLst>
-          </p:cNvPr>
-          <p:cNvSpPr>
-            <a:spLocks noGrp="1"/>
-          </p:cNvSpPr>
-          <p:nvPr>
-            <p:ph idx="1"/>
-          </p:nvPr>
-        </p:nvSpPr>
-        <p:spPr/>
-        <p:txBody>
-          <a:bodyPr>
-            <a:normAutofit/>
-          </a:bodyPr>
-          <a:lstStyle/>
-          <a:p>
-            <a:pPr marL="0" indent="0">
-              <a:buNone/>
-            </a:pPr>
-            <a:r>
-              <a:rPr lang="en-US" sz="1800" dirty="0"/>
-              <a:t>Problems to solve</a:t>
-            </a:r>
-          </a:p>
-          <a:p>
-            <a:pPr marL="0" indent="0">
-              <a:buNone/>
-            </a:pPr>
-            <a:r>
-              <a:rPr lang="en-US" sz="1800" dirty="0"/>
-              <a:t>Database structure: how to feed all the samples to the network (separate the samples by sample ID)</a:t>
-            </a:r>
-          </a:p>
-          <a:p>
-            <a:pPr marL="0" indent="0">
-              <a:buNone/>
-            </a:pPr>
-            <a:endParaRPr lang="en-US" sz="1800" dirty="0"/>
-          </a:p>
-        </p:txBody>
-      </p:sp>
-    </p:spTree>
-    <p:extLst>
-      <p:ext uri="{BB962C8B-B14F-4D97-AF65-F5344CB8AC3E}">
-        <p14:creationId xmlns:p14="http://schemas.microsoft.com/office/powerpoint/2010/main" val="2822131384"/>
-      </p:ext>
-    </p:extLst>
-  </p:cSld>
-  <p:clrMapOvr>
-    <a:masterClrMapping/>
-  </p:clrMapOvr>
-</p:sld>
-</file>
-
-<file path=ppt/slides/slide5.xml><?xml version="1.0" encoding="utf-8"?>
-<p:sld xmlns:a="http://schemas.openxmlformats.org/drawingml/2006/main" xmlns:r="http://schemas.openxmlformats.org/officeDocument/2006/relationships" xmlns:p="http://schemas.openxmlformats.org/presentationml/2006/main">
-  <p:cSld>
-    <p:spTree>
-      <p:nvGrpSpPr>
-        <p:cNvPr id="1" name=""/>
-        <p:cNvGrpSpPr/>
-        <p:nvPr/>
-      </p:nvGrpSpPr>
-      <p:grpSpPr>
-        <a:xfrm>
-          <a:off x="0" y="0"/>
-          <a:ext cx="0" cy="0"/>
-          <a:chOff x="0" y="0"/>
-          <a:chExt cx="0" cy="0"/>
-        </a:xfrm>
-      </p:grpSpPr>
-      <p:sp>
-        <p:nvSpPr>
-          <p:cNvPr id="2" name="Title 1">
-            <a:extLst>
-              <a:ext uri="{FF2B5EF4-FFF2-40B4-BE49-F238E27FC236}">
                 <a16:creationId xmlns:a16="http://schemas.microsoft.com/office/drawing/2014/main" id="{2B1C37AE-5DCD-9900-F778-DD45A29B1226}"/>
               </a:ext>
             </a:extLst>
@@ -4908,7 +3497,7 @@
 </p:sld>
 </file>
 
-<file path=ppt/slides/slide6.xml><?xml version="1.0" encoding="utf-8"?>
+<file path=ppt/slides/slide2.xml><?xml version="1.0" encoding="utf-8"?>
 <p:sld xmlns:a="http://schemas.openxmlformats.org/drawingml/2006/main" xmlns:r="http://schemas.openxmlformats.org/officeDocument/2006/relationships" xmlns:p="http://schemas.openxmlformats.org/presentationml/2006/main">
   <p:cSld>
     <p:spTree>
@@ -5078,7 +3667,7 @@
 </p:sld>
 </file>
 
-<file path=ppt/slides/slide7.xml><?xml version="1.0" encoding="utf-8"?>
+<file path=ppt/slides/slide3.xml><?xml version="1.0" encoding="utf-8"?>
 <p:sld xmlns:a="http://schemas.openxmlformats.org/drawingml/2006/main" xmlns:r="http://schemas.openxmlformats.org/officeDocument/2006/relationships" xmlns:p="http://schemas.openxmlformats.org/presentationml/2006/main">
   <p:cSld>
     <p:spTree>

</xml_diff>